<commit_message>
added group presentation without codes (cut)
</commit_message>
<xml_diff>
--- a/Group 4 Presentation (cut).pptx
+++ b/Group 4 Presentation (cut).pptx
@@ -7089,7 +7089,7 @@
           <a:p>
             <a:fld id="{655A5808-3B61-48CC-92EF-85AC2E0DFA56}" type="datetime2">
               <a:rPr lang="en-US" smtClean="0"/>
-              <a:t>Friday, January 27, 2023</a:t>
+              <a:t>Sunday, January 29, 2023</a:t>
             </a:fld>
             <a:endParaRPr lang="en-US"/>
           </a:p>
@@ -7287,7 +7287,7 @@
           <a:p>
             <a:fld id="{735E98AF-4574-4509-BF7A-519ACD5BF826}" type="datetime2">
               <a:rPr lang="en-US" smtClean="0"/>
-              <a:t>Friday, January 27, 2023</a:t>
+              <a:t>Sunday, January 29, 2023</a:t>
             </a:fld>
             <a:endParaRPr lang="en-US"/>
           </a:p>
@@ -7497,7 +7497,7 @@
           <a:p>
             <a:fld id="{93DD97D4-9636-490F-85D0-E926C2B6F3B1}" type="datetime2">
               <a:rPr lang="en-US" smtClean="0"/>
-              <a:t>Friday, January 27, 2023</a:t>
+              <a:t>Sunday, January 29, 2023</a:t>
             </a:fld>
             <a:endParaRPr lang="en-US"/>
           </a:p>
@@ -7696,7 +7696,7 @@
           <a:p>
             <a:fld id="{2F3AF3C6-0FD4-4939-991C-00DDE5C56815}" type="datetime2">
               <a:rPr lang="en-US" smtClean="0"/>
-              <a:t>Friday, January 27, 2023</a:t>
+              <a:t>Sunday, January 29, 2023</a:t>
             </a:fld>
             <a:endParaRPr lang="en-US"/>
           </a:p>
@@ -7977,7 +7977,7 @@
           <a:p>
             <a:fld id="{86807482-8128-47C6-A8DD-6452B0291CFF}" type="datetime2">
               <a:rPr lang="en-US" smtClean="0"/>
-              <a:t>Friday, January 27, 2023</a:t>
+              <a:t>Sunday, January 29, 2023</a:t>
             </a:fld>
             <a:endParaRPr lang="en-US"/>
           </a:p>
@@ -8245,7 +8245,7 @@
           <a:p>
             <a:fld id="{37903F25-275E-41DE-BE3B-EBF0DB49F9B1}" type="datetime2">
               <a:rPr lang="en-US" smtClean="0"/>
-              <a:t>Friday, January 27, 2023</a:t>
+              <a:t>Sunday, January 29, 2023</a:t>
             </a:fld>
             <a:endParaRPr lang="en-US"/>
           </a:p>
@@ -8626,7 +8626,7 @@
           <a:p>
             <a:fld id="{EE475572-4A44-4171-84AA-64D42C8050A6}" type="datetime2">
               <a:rPr lang="en-US" smtClean="0"/>
-              <a:t>Friday, January 27, 2023</a:t>
+              <a:t>Sunday, January 29, 2023</a:t>
             </a:fld>
             <a:endParaRPr lang="en-US"/>
           </a:p>
@@ -8796,7 +8796,7 @@
           <a:p>
             <a:fld id="{C4C1612E-528E-4FD5-9E9E-E15F1108F171}" type="datetime2">
               <a:rPr lang="en-US" smtClean="0"/>
-              <a:t>Friday, January 27, 2023</a:t>
+              <a:t>Sunday, January 29, 2023</a:t>
             </a:fld>
             <a:endParaRPr lang="en-US"/>
           </a:p>
@@ -8909,7 +8909,7 @@
           <a:p>
             <a:fld id="{D4F6D862-A06D-436F-A92E-EBAAD50B6E50}" type="datetime2">
               <a:rPr lang="en-US" smtClean="0"/>
-              <a:t>Friday, January 27, 2023</a:t>
+              <a:t>Sunday, January 29, 2023</a:t>
             </a:fld>
             <a:endParaRPr lang="en-US"/>
           </a:p>
@@ -9226,7 +9226,7 @@
           <a:p>
             <a:fld id="{B73E0B7D-2260-4809-8F0A-9E5F3E24F169}" type="datetime2">
               <a:rPr lang="en-US" smtClean="0"/>
-              <a:t>Friday, January 27, 2023</a:t>
+              <a:t>Sunday, January 29, 2023</a:t>
             </a:fld>
             <a:endParaRPr lang="en-US"/>
           </a:p>
@@ -9518,7 +9518,7 @@
           <a:p>
             <a:fld id="{3C8E4735-C637-46A3-94EB-AB3AC4188D2F}" type="datetime2">
               <a:rPr lang="en-US" smtClean="0"/>
-              <a:t>Friday, January 27, 2023</a:t>
+              <a:t>Sunday, January 29, 2023</a:t>
             </a:fld>
             <a:endParaRPr lang="en-US"/>
           </a:p>
@@ -9886,7 +9886,7 @@
             <a:fld id="{AE0C963C-C1DB-4AFD-9DDC-0691666BF49B}" type="datetime2">
               <a:rPr lang="en-US" smtClean="0"/>
               <a:pPr/>
-              <a:t>Friday, January 27, 2023</a:t>
+              <a:t>Sunday, January 29, 2023</a:t>
             </a:fld>
             <a:endParaRPr lang="en-US" cap="all" dirty="0"/>
           </a:p>
@@ -11662,10 +11662,10 @@
       </p:grpSpPr>
       <p:pic>
         <p:nvPicPr>
-          <p:cNvPr id="5" name="Picture 4">
+          <p:cNvPr id="7" name="Picture 6">
             <a:extLst>
               <a:ext uri="{FF2B5EF4-FFF2-40B4-BE49-F238E27FC236}">
-                <a16:creationId xmlns:a16="http://schemas.microsoft.com/office/drawing/2014/main" id="{9099C0BA-39E5-22F7-F35A-988783D77E2B}"/>
+                <a16:creationId xmlns:a16="http://schemas.microsoft.com/office/drawing/2014/main" id="{C5F561E8-2611-79AB-F01D-80704C4DB0A5}"/>
               </a:ext>
             </a:extLst>
           </p:cNvPr>
@@ -11676,36 +11676,6 @@
         </p:nvPicPr>
         <p:blipFill>
           <a:blip r:embed="rId2"/>
-          <a:stretch>
-            <a:fillRect/>
-          </a:stretch>
-        </p:blipFill>
-        <p:spPr>
-          <a:xfrm>
-            <a:off x="344279" y="640917"/>
-            <a:ext cx="4099915" cy="4000847"/>
-          </a:xfrm>
-          <a:prstGeom prst="rect">
-            <a:avLst/>
-          </a:prstGeom>
-        </p:spPr>
-      </p:pic>
-      <p:pic>
-        <p:nvPicPr>
-          <p:cNvPr id="7" name="Picture 6">
-            <a:extLst>
-              <a:ext uri="{FF2B5EF4-FFF2-40B4-BE49-F238E27FC236}">
-                <a16:creationId xmlns:a16="http://schemas.microsoft.com/office/drawing/2014/main" id="{C5F561E8-2611-79AB-F01D-80704C4DB0A5}"/>
-              </a:ext>
-            </a:extLst>
-          </p:cNvPr>
-          <p:cNvPicPr>
-            <a:picLocks noChangeAspect="1"/>
-          </p:cNvPicPr>
-          <p:nvPr/>
-        </p:nvPicPr>
-        <p:blipFill>
-          <a:blip r:embed="rId3"/>
           <a:stretch>
             <a:fillRect/>
           </a:stretch>
@@ -11735,7 +11705,7 @@
           <p:nvPr/>
         </p:nvPicPr>
         <p:blipFill rotWithShape="1">
-          <a:blip r:embed="rId4"/>
+          <a:blip r:embed="rId3"/>
           <a:srcRect t="2144"/>
           <a:stretch/>
         </p:blipFill>
@@ -11784,6 +11754,36 @@
           </a:p>
         </p:txBody>
       </p:sp>
+      <p:pic>
+        <p:nvPicPr>
+          <p:cNvPr id="4" name="Picture 3">
+            <a:extLst>
+              <a:ext uri="{FF2B5EF4-FFF2-40B4-BE49-F238E27FC236}">
+                <a16:creationId xmlns:a16="http://schemas.microsoft.com/office/drawing/2014/main" id="{E25456DA-A04B-7604-85D1-8E2A77058E73}"/>
+              </a:ext>
+            </a:extLst>
+          </p:cNvPr>
+          <p:cNvPicPr>
+            <a:picLocks noChangeAspect="1"/>
+          </p:cNvPicPr>
+          <p:nvPr/>
+        </p:nvPicPr>
+        <p:blipFill>
+          <a:blip r:embed="rId4"/>
+          <a:stretch>
+            <a:fillRect/>
+          </a:stretch>
+        </p:blipFill>
+        <p:spPr>
+          <a:xfrm>
+            <a:off x="279465" y="646667"/>
+            <a:ext cx="4164729" cy="4102290"/>
+          </a:xfrm>
+          <a:prstGeom prst="rect">
+            <a:avLst/>
+          </a:prstGeom>
+        </p:spPr>
+      </p:pic>
     </p:spTree>
     <p:extLst>
       <p:ext uri="{BB962C8B-B14F-4D97-AF65-F5344CB8AC3E}">

</xml_diff>

<commit_message>
updated group presentation without codes (cut)
</commit_message>
<xml_diff>
--- a/Group 4 Presentation (cut).pptx
+++ b/Group 4 Presentation (cut).pptx
@@ -18,8 +18,8 @@
     <p:sldId id="277" r:id="rId12"/>
     <p:sldId id="282" r:id="rId13"/>
     <p:sldId id="295" r:id="rId14"/>
-    <p:sldId id="281" r:id="rId15"/>
-    <p:sldId id="283" r:id="rId16"/>
+    <p:sldId id="283" r:id="rId15"/>
+    <p:sldId id="281" r:id="rId16"/>
     <p:sldId id="284" r:id="rId17"/>
     <p:sldId id="285" r:id="rId18"/>
     <p:sldId id="286" r:id="rId19"/>
@@ -11894,6 +11894,106 @@
 <file path=ppt/slides/slide14.xml><?xml version="1.0" encoding="utf-8"?>
 <p:sld xmlns:a="http://schemas.openxmlformats.org/drawingml/2006/main" xmlns:r="http://schemas.openxmlformats.org/officeDocument/2006/relationships" xmlns:p="http://schemas.openxmlformats.org/presentationml/2006/main">
   <p:cSld>
+    <p:spTree>
+      <p:nvGrpSpPr>
+        <p:cNvPr id="1" name=""/>
+        <p:cNvGrpSpPr/>
+        <p:nvPr/>
+      </p:nvGrpSpPr>
+      <p:grpSpPr>
+        <a:xfrm>
+          <a:off x="0" y="0"/>
+          <a:ext cx="0" cy="0"/>
+          <a:chOff x="0" y="0"/>
+          <a:chExt cx="0" cy="0"/>
+        </a:xfrm>
+      </p:grpSpPr>
+      <p:sp>
+        <p:nvSpPr>
+          <p:cNvPr id="2" name="Title 1">
+            <a:extLst>
+              <a:ext uri="{FF2B5EF4-FFF2-40B4-BE49-F238E27FC236}">
+                <a16:creationId xmlns:a16="http://schemas.microsoft.com/office/drawing/2014/main" id="{7573547F-EA0C-27F4-B9C5-58CC28995F67}"/>
+              </a:ext>
+            </a:extLst>
+          </p:cNvPr>
+          <p:cNvSpPr>
+            <a:spLocks noGrp="1"/>
+          </p:cNvSpPr>
+          <p:nvPr>
+            <p:ph type="title"/>
+          </p:nvPr>
+        </p:nvSpPr>
+        <p:spPr>
+          <a:xfrm>
+            <a:off x="975360" y="804859"/>
+            <a:ext cx="10241280" cy="1234440"/>
+          </a:xfrm>
+        </p:spPr>
+        <p:txBody>
+          <a:bodyPr/>
+          <a:lstStyle/>
+          <a:p>
+            <a:pPr algn="ctr"/>
+            <a:r>
+              <a:rPr lang="en-US" dirty="0"/>
+              <a:t>The baseline model: </a:t>
+            </a:r>
+            <a:br>
+              <a:rPr lang="en-US" dirty="0"/>
+            </a:br>
+            <a:r>
+              <a:rPr lang="en-US" dirty="0"/>
+              <a:t>logistic regression</a:t>
+            </a:r>
+          </a:p>
+        </p:txBody>
+      </p:sp>
+      <p:pic>
+        <p:nvPicPr>
+          <p:cNvPr id="5" name="Picture 4">
+            <a:extLst>
+              <a:ext uri="{FF2B5EF4-FFF2-40B4-BE49-F238E27FC236}">
+                <a16:creationId xmlns:a16="http://schemas.microsoft.com/office/drawing/2014/main" id="{18A23B7F-2300-CC53-C2D9-87295C0E08B6}"/>
+              </a:ext>
+            </a:extLst>
+          </p:cNvPr>
+          <p:cNvPicPr>
+            <a:picLocks noChangeAspect="1"/>
+          </p:cNvPicPr>
+          <p:nvPr/>
+        </p:nvPicPr>
+        <p:blipFill rotWithShape="1">
+          <a:blip r:embed="rId2"/>
+          <a:srcRect t="35762"/>
+          <a:stretch/>
+        </p:blipFill>
+        <p:spPr>
+          <a:xfrm>
+            <a:off x="1328988" y="2192693"/>
+            <a:ext cx="10198668" cy="895739"/>
+          </a:xfrm>
+          <a:prstGeom prst="rect">
+            <a:avLst/>
+          </a:prstGeom>
+        </p:spPr>
+      </p:pic>
+    </p:spTree>
+    <p:extLst>
+      <p:ext uri="{BB962C8B-B14F-4D97-AF65-F5344CB8AC3E}">
+        <p14:creationId xmlns:p14="http://schemas.microsoft.com/office/powerpoint/2010/main" val="2324686325"/>
+      </p:ext>
+    </p:extLst>
+  </p:cSld>
+  <p:clrMapOvr>
+    <a:masterClrMapping/>
+  </p:clrMapOvr>
+</p:sld>
+</file>
+
+<file path=ppt/slides/slide15.xml><?xml version="1.0" encoding="utf-8"?>
+<p:sld xmlns:a="http://schemas.openxmlformats.org/drawingml/2006/main" xmlns:r="http://schemas.openxmlformats.org/officeDocument/2006/relationships" xmlns:p="http://schemas.openxmlformats.org/presentationml/2006/main">
+  <p:cSld>
     <p:bg>
       <p:bgPr>
         <a:solidFill>
@@ -12622,106 +12722,6 @@
     <p:extLst>
       <p:ext uri="{BB962C8B-B14F-4D97-AF65-F5344CB8AC3E}">
         <p14:creationId xmlns:p14="http://schemas.microsoft.com/office/powerpoint/2010/main" val="3542824041"/>
-      </p:ext>
-    </p:extLst>
-  </p:cSld>
-  <p:clrMapOvr>
-    <a:masterClrMapping/>
-  </p:clrMapOvr>
-</p:sld>
-</file>
-
-<file path=ppt/slides/slide15.xml><?xml version="1.0" encoding="utf-8"?>
-<p:sld xmlns:a="http://schemas.openxmlformats.org/drawingml/2006/main" xmlns:r="http://schemas.openxmlformats.org/officeDocument/2006/relationships" xmlns:p="http://schemas.openxmlformats.org/presentationml/2006/main">
-  <p:cSld>
-    <p:spTree>
-      <p:nvGrpSpPr>
-        <p:cNvPr id="1" name=""/>
-        <p:cNvGrpSpPr/>
-        <p:nvPr/>
-      </p:nvGrpSpPr>
-      <p:grpSpPr>
-        <a:xfrm>
-          <a:off x="0" y="0"/>
-          <a:ext cx="0" cy="0"/>
-          <a:chOff x="0" y="0"/>
-          <a:chExt cx="0" cy="0"/>
-        </a:xfrm>
-      </p:grpSpPr>
-      <p:sp>
-        <p:nvSpPr>
-          <p:cNvPr id="2" name="Title 1">
-            <a:extLst>
-              <a:ext uri="{FF2B5EF4-FFF2-40B4-BE49-F238E27FC236}">
-                <a16:creationId xmlns:a16="http://schemas.microsoft.com/office/drawing/2014/main" id="{7573547F-EA0C-27F4-B9C5-58CC28995F67}"/>
-              </a:ext>
-            </a:extLst>
-          </p:cNvPr>
-          <p:cNvSpPr>
-            <a:spLocks noGrp="1"/>
-          </p:cNvSpPr>
-          <p:nvPr>
-            <p:ph type="title"/>
-          </p:nvPr>
-        </p:nvSpPr>
-        <p:spPr>
-          <a:xfrm>
-            <a:off x="975360" y="804859"/>
-            <a:ext cx="10241280" cy="1234440"/>
-          </a:xfrm>
-        </p:spPr>
-        <p:txBody>
-          <a:bodyPr/>
-          <a:lstStyle/>
-          <a:p>
-            <a:pPr algn="ctr"/>
-            <a:r>
-              <a:rPr lang="en-US" dirty="0"/>
-              <a:t>The baseline model: </a:t>
-            </a:r>
-            <a:br>
-              <a:rPr lang="en-US" dirty="0"/>
-            </a:br>
-            <a:r>
-              <a:rPr lang="en-US" dirty="0"/>
-              <a:t>logistic regression</a:t>
-            </a:r>
-          </a:p>
-        </p:txBody>
-      </p:sp>
-      <p:pic>
-        <p:nvPicPr>
-          <p:cNvPr id="5" name="Picture 4">
-            <a:extLst>
-              <a:ext uri="{FF2B5EF4-FFF2-40B4-BE49-F238E27FC236}">
-                <a16:creationId xmlns:a16="http://schemas.microsoft.com/office/drawing/2014/main" id="{18A23B7F-2300-CC53-C2D9-87295C0E08B6}"/>
-              </a:ext>
-            </a:extLst>
-          </p:cNvPr>
-          <p:cNvPicPr>
-            <a:picLocks noChangeAspect="1"/>
-          </p:cNvPicPr>
-          <p:nvPr/>
-        </p:nvPicPr>
-        <p:blipFill rotWithShape="1">
-          <a:blip r:embed="rId2"/>
-          <a:srcRect t="35762"/>
-          <a:stretch/>
-        </p:blipFill>
-        <p:spPr>
-          <a:xfrm>
-            <a:off x="1328988" y="2192693"/>
-            <a:ext cx="10198668" cy="895739"/>
-          </a:xfrm>
-          <a:prstGeom prst="rect">
-            <a:avLst/>
-          </a:prstGeom>
-        </p:spPr>
-      </p:pic>
-    </p:spTree>
-    <p:extLst>
-      <p:ext uri="{BB962C8B-B14F-4D97-AF65-F5344CB8AC3E}">
-        <p14:creationId xmlns:p14="http://schemas.microsoft.com/office/powerpoint/2010/main" val="2324686325"/>
       </p:ext>
     </p:extLst>
   </p:cSld>

</xml_diff>